<commit_message>
Changed poster based on feedback
</commit_message>
<xml_diff>
--- a/Docs/streamgauge-poster.pptx
+++ b/Docs/streamgauge-poster.pptx
@@ -197,7 +197,7 @@
           <a:p>
             <a:fld id="{D9D1B2E4-38EE-479A-87A8-AA943214FC9D}" type="datetimeFigureOut">
               <a:rPr lang="en-US" smtClean="0"/>
-              <a:t>4/15/2018</a:t>
+              <a:t>4/22/2018</a:t>
             </a:fld>
             <a:endParaRPr lang="en-US"/>
           </a:p>
@@ -680,7 +680,7 @@
           <a:p>
             <a:fld id="{C3373DE7-29FA-4095-8C28-A43CB44A68A2}" type="datetimeFigureOut">
               <a:rPr lang="en-US" smtClean="0"/>
-              <a:t>4/15/2018</a:t>
+              <a:t>4/22/2018</a:t>
             </a:fld>
             <a:endParaRPr lang="en-US"/>
           </a:p>
@@ -850,7 +850,7 @@
           <a:p>
             <a:fld id="{C3373DE7-29FA-4095-8C28-A43CB44A68A2}" type="datetimeFigureOut">
               <a:rPr lang="en-US" smtClean="0"/>
-              <a:t>4/15/2018</a:t>
+              <a:t>4/22/2018</a:t>
             </a:fld>
             <a:endParaRPr lang="en-US"/>
           </a:p>
@@ -1030,7 +1030,7 @@
           <a:p>
             <a:fld id="{C3373DE7-29FA-4095-8C28-A43CB44A68A2}" type="datetimeFigureOut">
               <a:rPr lang="en-US" smtClean="0"/>
-              <a:t>4/15/2018</a:t>
+              <a:t>4/22/2018</a:t>
             </a:fld>
             <a:endParaRPr lang="en-US"/>
           </a:p>
@@ -1200,7 +1200,7 @@
           <a:p>
             <a:fld id="{C3373DE7-29FA-4095-8C28-A43CB44A68A2}" type="datetimeFigureOut">
               <a:rPr lang="en-US" smtClean="0"/>
-              <a:t>4/15/2018</a:t>
+              <a:t>4/22/2018</a:t>
             </a:fld>
             <a:endParaRPr lang="en-US"/>
           </a:p>
@@ -1444,7 +1444,7 @@
           <a:p>
             <a:fld id="{C3373DE7-29FA-4095-8C28-A43CB44A68A2}" type="datetimeFigureOut">
               <a:rPr lang="en-US" smtClean="0"/>
-              <a:t>4/15/2018</a:t>
+              <a:t>4/22/2018</a:t>
             </a:fld>
             <a:endParaRPr lang="en-US"/>
           </a:p>
@@ -1676,7 +1676,7 @@
           <a:p>
             <a:fld id="{C3373DE7-29FA-4095-8C28-A43CB44A68A2}" type="datetimeFigureOut">
               <a:rPr lang="en-US" smtClean="0"/>
-              <a:t>4/15/2018</a:t>
+              <a:t>4/22/2018</a:t>
             </a:fld>
             <a:endParaRPr lang="en-US"/>
           </a:p>
@@ -2043,7 +2043,7 @@
           <a:p>
             <a:fld id="{C3373DE7-29FA-4095-8C28-A43CB44A68A2}" type="datetimeFigureOut">
               <a:rPr lang="en-US" smtClean="0"/>
-              <a:t>4/15/2018</a:t>
+              <a:t>4/22/2018</a:t>
             </a:fld>
             <a:endParaRPr lang="en-US"/>
           </a:p>
@@ -2161,7 +2161,7 @@
           <a:p>
             <a:fld id="{C3373DE7-29FA-4095-8C28-A43CB44A68A2}" type="datetimeFigureOut">
               <a:rPr lang="en-US" smtClean="0"/>
-              <a:t>4/15/2018</a:t>
+              <a:t>4/22/2018</a:t>
             </a:fld>
             <a:endParaRPr lang="en-US"/>
           </a:p>
@@ -2256,7 +2256,7 @@
           <a:p>
             <a:fld id="{C3373DE7-29FA-4095-8C28-A43CB44A68A2}" type="datetimeFigureOut">
               <a:rPr lang="en-US" smtClean="0"/>
-              <a:t>4/15/2018</a:t>
+              <a:t>4/22/2018</a:t>
             </a:fld>
             <a:endParaRPr lang="en-US"/>
           </a:p>
@@ -2533,7 +2533,7 @@
           <a:p>
             <a:fld id="{C3373DE7-29FA-4095-8C28-A43CB44A68A2}" type="datetimeFigureOut">
               <a:rPr lang="en-US" smtClean="0"/>
-              <a:t>4/15/2018</a:t>
+              <a:t>4/22/2018</a:t>
             </a:fld>
             <a:endParaRPr lang="en-US"/>
           </a:p>
@@ -2790,7 +2790,7 @@
           <a:p>
             <a:fld id="{C3373DE7-29FA-4095-8C28-A43CB44A68A2}" type="datetimeFigureOut">
               <a:rPr lang="en-US" smtClean="0"/>
-              <a:t>4/15/2018</a:t>
+              <a:t>4/22/2018</a:t>
             </a:fld>
             <a:endParaRPr lang="en-US"/>
           </a:p>
@@ -3003,7 +3003,7 @@
           <a:p>
             <a:fld id="{C3373DE7-29FA-4095-8C28-A43CB44A68A2}" type="datetimeFigureOut">
               <a:rPr lang="en-US" smtClean="0"/>
-              <a:t>4/15/2018</a:t>
+              <a:t>4/22/2018</a:t>
             </a:fld>
             <a:endParaRPr lang="en-US"/>
           </a:p>
@@ -3449,13 +3449,13 @@
         </p:nvSpPr>
         <p:spPr>
           <a:xfrm>
-            <a:off x="0" y="914400"/>
-            <a:ext cx="32918400" cy="1181100"/>
+            <a:off x="0" y="482145"/>
+            <a:ext cx="32918400" cy="1613355"/>
           </a:xfrm>
         </p:spPr>
         <p:txBody>
           <a:bodyPr>
-            <a:normAutofit/>
+            <a:normAutofit fontScale="90000"/>
           </a:bodyPr>
           <a:lstStyle/>
           <a:p>
@@ -3463,7 +3463,24 @@
               <a:rPr lang="en-US" sz="6600" b="1" dirty="0" smtClean="0">
                 <a:latin typeface="Bell MT" panose="02020503060305020303" pitchFamily="18" charset="0"/>
               </a:rPr>
-              <a:t>Water detection using machine learning</a:t>
+              <a:t>Water detection </a:t>
+            </a:r>
+            <a:r>
+              <a:rPr lang="en-US" sz="6600" b="1" dirty="0" smtClean="0">
+                <a:latin typeface="Bell MT" panose="02020503060305020303" pitchFamily="18" charset="0"/>
+              </a:rPr>
+              <a:t>in an image using HOG and </a:t>
+            </a:r>
+            <a:br>
+              <a:rPr lang="en-US" sz="6600" b="1" dirty="0" smtClean="0">
+                <a:latin typeface="Bell MT" panose="02020503060305020303" pitchFamily="18" charset="0"/>
+              </a:rPr>
+            </a:br>
+            <a:r>
+              <a:rPr lang="en-US" sz="6600" b="1" dirty="0" smtClean="0">
+                <a:latin typeface="Bell MT" panose="02020503060305020303" pitchFamily="18" charset="0"/>
+              </a:rPr>
+              <a:t>Neural Networks</a:t>
             </a:r>
             <a:endParaRPr lang="en-US" sz="6600" b="1" dirty="0">
               <a:latin typeface="Bell MT" panose="02020503060305020303" pitchFamily="18" charset="0"/>
@@ -3836,8 +3853,8 @@
         </p:nvSpPr>
         <p:spPr>
           <a:xfrm>
-            <a:off x="438150" y="17769556"/>
-            <a:ext cx="31737300" cy="1846659"/>
+            <a:off x="438151" y="17769556"/>
+            <a:ext cx="14535150" cy="2954655"/>
           </a:xfrm>
           <a:prstGeom prst="rect">
             <a:avLst/>
@@ -3864,16 +3881,48 @@
                 <a:latin typeface="Arial" panose="020B0604020202020204" pitchFamily="34" charset="0"/>
                 <a:cs typeface="Arial" panose="020B0604020202020204" pitchFamily="34" charset="0"/>
               </a:rPr>
-              <a:t>The Neural Network was not able to pick up and learn the differences between the bands representing water or not water.</a:t>
-            </a:r>
-          </a:p>
-          <a:p>
+              <a:t>The Neural Network </a:t>
+            </a:r>
+            <a:r>
+              <a:rPr lang="en-US" sz="2400" dirty="0" smtClean="0">
+                <a:latin typeface="Arial" panose="020B0604020202020204" pitchFamily="34" charset="0"/>
+                <a:cs typeface="Arial" panose="020B0604020202020204" pitchFamily="34" charset="0"/>
+              </a:rPr>
+              <a:t>using HOG features </a:t>
+            </a:r>
+            <a:r>
+              <a:rPr lang="en-US" sz="2400" dirty="0" smtClean="0">
+                <a:latin typeface="Arial" panose="020B0604020202020204" pitchFamily="34" charset="0"/>
+                <a:cs typeface="Arial" panose="020B0604020202020204" pitchFamily="34" charset="0"/>
+              </a:rPr>
+              <a:t>was </a:t>
+            </a:r>
+            <a:r>
+              <a:rPr lang="en-US" sz="2400" dirty="0" smtClean="0">
+                <a:latin typeface="Arial" panose="020B0604020202020204" pitchFamily="34" charset="0"/>
+                <a:cs typeface="Arial" panose="020B0604020202020204" pitchFamily="34" charset="0"/>
+              </a:rPr>
+              <a:t>not able to pick up and learn the differences between the bands representing water or not water</a:t>
+            </a:r>
+            <a:r>
+              <a:rPr lang="en-US" sz="2400" dirty="0" smtClean="0">
+                <a:latin typeface="Arial" panose="020B0604020202020204" pitchFamily="34" charset="0"/>
+                <a:cs typeface="Arial" panose="020B0604020202020204" pitchFamily="34" charset="0"/>
+              </a:rPr>
+              <a:t>.</a:t>
+            </a:r>
             <a:endParaRPr lang="en-US" sz="2400" dirty="0" smtClean="0">
               <a:latin typeface="Arial" panose="020B0604020202020204" pitchFamily="34" charset="0"/>
               <a:cs typeface="Arial" panose="020B0604020202020204" pitchFamily="34" charset="0"/>
             </a:endParaRPr>
           </a:p>
           <a:p>
+            <a:endParaRPr lang="en-US" sz="2400" dirty="0" smtClean="0">
+              <a:latin typeface="Arial" panose="020B0604020202020204" pitchFamily="34" charset="0"/>
+              <a:cs typeface="Arial" panose="020B0604020202020204" pitchFamily="34" charset="0"/>
+            </a:endParaRPr>
+          </a:p>
+          <a:p>
             <a:r>
               <a:rPr lang="en-US" sz="2400" dirty="0" smtClean="0">
                 <a:latin typeface="Arial" panose="020B0604020202020204" pitchFamily="34" charset="0"/>
@@ -3952,7 +4001,7 @@
         </p:nvSpPr>
         <p:spPr>
           <a:xfrm>
-            <a:off x="438058" y="19656681"/>
+            <a:off x="15423242" y="16841954"/>
             <a:ext cx="6934200" cy="923330"/>
           </a:xfrm>
           <a:prstGeom prst="rect">
@@ -3986,8 +4035,8 @@
         </p:nvSpPr>
         <p:spPr>
           <a:xfrm>
-            <a:off x="438058" y="20580011"/>
-            <a:ext cx="31756442" cy="738664"/>
+            <a:off x="15423242" y="17765284"/>
+            <a:ext cx="17051021" cy="1477328"/>
           </a:xfrm>
           <a:prstGeom prst="rect">
             <a:avLst/>
@@ -4031,7 +4080,29 @@
             </a:r>
             <a:r>
               <a:rPr lang="en-US" sz="2400" dirty="0"/>
-              <a:t>, B., “Histograms of Oriented Gradients for Human Detection,” IEEE Computer Society Conference on Computer Vision and Pattern Recognition, 2005, San Diego, CA, USA</a:t>
+              <a:t>, B., “Histograms of Oriented Gradients for Human Detection,” IEEE Computer Society Conference on Computer Vision and Pattern Recognition, 2005, San Diego, CA, </a:t>
+            </a:r>
+            <a:r>
+              <a:rPr lang="en-US" sz="2400" dirty="0" smtClean="0"/>
+              <a:t>USA</a:t>
+            </a:r>
+          </a:p>
+          <a:p>
+            <a:r>
+              <a:rPr lang="en-US" sz="2400" baseline="30000" dirty="0" smtClean="0"/>
+              <a:t>[2]</a:t>
+            </a:r>
+            <a:r>
+              <a:rPr lang="en-US" sz="2400" dirty="0" smtClean="0"/>
+              <a:t> Dr. </a:t>
+            </a:r>
+            <a:r>
+              <a:rPr lang="en-US" sz="2400" dirty="0" err="1" smtClean="0"/>
+              <a:t>Cenek</a:t>
+            </a:r>
+            <a:r>
+              <a:rPr lang="en-US" sz="2400" dirty="0" smtClean="0"/>
+              <a:t>.  Expertise and direction.</a:t>
             </a:r>
             <a:endParaRPr lang="en-US" sz="2400" dirty="0"/>
           </a:p>
@@ -4045,8 +4116,8 @@
         </p:nvSpPr>
         <p:spPr>
           <a:xfrm>
-            <a:off x="10900785" y="2095500"/>
-            <a:ext cx="10789364" cy="830997"/>
+            <a:off x="11939533" y="2095500"/>
+            <a:ext cx="9039334" cy="1569660"/>
           </a:xfrm>
           <a:prstGeom prst="rect">
             <a:avLst/>
@@ -4059,10 +4130,37 @@
           </a:bodyPr>
           <a:lstStyle/>
           <a:p>
+            <a:pPr lvl="0"/>
             <a:r>
               <a:rPr lang="en-US" sz="4800" dirty="0" smtClean="0"/>
-              <a:t>Timothy Harrelson and Jeremy Swartwood</a:t>
-            </a:r>
+              <a:t>Timothy Harrelson	</a:t>
+            </a:r>
+            <a:r>
+              <a:rPr lang="en-US" sz="2800" dirty="0" smtClean="0">
+                <a:solidFill>
+                  <a:prstClr val="black"/>
+                </a:solidFill>
+                <a:hlinkClick r:id="rId3"/>
+              </a:rPr>
+              <a:t>tgharrelson@alaska.edu</a:t>
+            </a:r>
+            <a:endParaRPr lang="en-US" sz="4800" dirty="0" smtClean="0"/>
+          </a:p>
+          <a:p>
+            <a:r>
+              <a:rPr lang="en-US" sz="4800" dirty="0" smtClean="0"/>
+              <a:t>Jeremy Swartwood	</a:t>
+            </a:r>
+            <a:r>
+              <a:rPr lang="en-US" sz="2800" dirty="0">
+                <a:solidFill>
+                  <a:prstClr val="black"/>
+                </a:solidFill>
+                <a:hlinkClick r:id="rId4"/>
+              </a:rPr>
+              <a:t>jswartwo@alaska.edu</a:t>
+            </a:r>
+            <a:endParaRPr lang="en-US" sz="4800" dirty="0" smtClean="0"/>
           </a:p>
         </p:txBody>
       </p:sp>
@@ -4136,7 +4234,21 @@
                 <a:latin typeface="Arial" panose="020B0604020202020204" pitchFamily="34" charset="0"/>
                 <a:cs typeface="Arial" panose="020B0604020202020204" pitchFamily="34" charset="0"/>
               </a:rPr>
-              <a:t>Our project is to make software capable of determining where water lies in an image, for use in determining heights of water for rivers and other bodies of water.  Current processes are expensive.  The proposed method will be cheaper and easier to implement and maintain.</a:t>
+              <a:t>Our project is to make software capable of determining where water lies in an </a:t>
+            </a:r>
+            <a:r>
+              <a:rPr lang="en-US" sz="2400" dirty="0" smtClean="0">
+                <a:latin typeface="Arial" panose="020B0604020202020204" pitchFamily="34" charset="0"/>
+                <a:cs typeface="Arial" panose="020B0604020202020204" pitchFamily="34" charset="0"/>
+              </a:rPr>
+              <a:t>image. These locations will then be used to determine </a:t>
+            </a:r>
+            <a:r>
+              <a:rPr lang="en-US" sz="2400" dirty="0" smtClean="0">
+                <a:latin typeface="Arial" panose="020B0604020202020204" pitchFamily="34" charset="0"/>
+                <a:cs typeface="Arial" panose="020B0604020202020204" pitchFamily="34" charset="0"/>
+              </a:rPr>
+              <a:t>heights of water for rivers and other bodies of water.  Current processes are expensive.  The proposed method will be cheaper and easier to implement and maintain.</a:t>
             </a:r>
           </a:p>
           <a:p>
@@ -4151,14 +4263,133 @@
                 <a:latin typeface="Arial" panose="020B0604020202020204" pitchFamily="34" charset="0"/>
                 <a:cs typeface="Arial" panose="020B0604020202020204" pitchFamily="34" charset="0"/>
               </a:rPr>
-              <a:t>Our method for determining where water is, uses an unsupervised approach with supervised validation of the results.  We will be reading in images, processing their data, and using machine learning to classify where water is in an image.  The process breaks down into three phases which are Pre-processing, Feature Extraction, and Classification.  Pre-processing is modifying the input images to be able to extract meaningful data from them.  Feature Extraction takes the preprocessed images and retrieves the pertinent data that identifies water vs. </a:t>
+              <a:t>Our method for determining where water is, uses an </a:t>
             </a:r>
             <a:r>
               <a:rPr lang="en-US" sz="2400" dirty="0" smtClean="0">
                 <a:latin typeface="Arial" panose="020B0604020202020204" pitchFamily="34" charset="0"/>
                 <a:cs typeface="Arial" panose="020B0604020202020204" pitchFamily="34" charset="0"/>
               </a:rPr>
-              <a:t>non-water.  Classification </a:t>
+              <a:t>automated approach </a:t>
+            </a:r>
+            <a:r>
+              <a:rPr lang="en-US" sz="2400" dirty="0">
+                <a:latin typeface="Arial" panose="020B0604020202020204" pitchFamily="34" charset="0"/>
+                <a:cs typeface="Arial" panose="020B0604020202020204" pitchFamily="34" charset="0"/>
+              </a:rPr>
+              <a:t>with supervised validation of the results.  We </a:t>
+            </a:r>
+            <a:r>
+              <a:rPr lang="en-US" sz="2400" dirty="0" smtClean="0">
+                <a:latin typeface="Arial" panose="020B0604020202020204" pitchFamily="34" charset="0"/>
+                <a:cs typeface="Arial" panose="020B0604020202020204" pitchFamily="34" charset="0"/>
+              </a:rPr>
+              <a:t>read in training </a:t>
+            </a:r>
+            <a:r>
+              <a:rPr lang="en-US" sz="2400" dirty="0">
+                <a:latin typeface="Arial" panose="020B0604020202020204" pitchFamily="34" charset="0"/>
+                <a:cs typeface="Arial" panose="020B0604020202020204" pitchFamily="34" charset="0"/>
+              </a:rPr>
+              <a:t>images, </a:t>
+            </a:r>
+            <a:r>
+              <a:rPr lang="en-US" sz="2400" dirty="0" smtClean="0">
+                <a:latin typeface="Arial" panose="020B0604020202020204" pitchFamily="34" charset="0"/>
+                <a:cs typeface="Arial" panose="020B0604020202020204" pitchFamily="34" charset="0"/>
+              </a:rPr>
+              <a:t>process </a:t>
+            </a:r>
+            <a:r>
+              <a:rPr lang="en-US" sz="2400" dirty="0">
+                <a:latin typeface="Arial" panose="020B0604020202020204" pitchFamily="34" charset="0"/>
+                <a:cs typeface="Arial" panose="020B0604020202020204" pitchFamily="34" charset="0"/>
+              </a:rPr>
+              <a:t>their data, and using machine learning to classify where water is in an image.  The process breaks down into three </a:t>
+            </a:r>
+            <a:r>
+              <a:rPr lang="en-US" sz="2400" dirty="0" smtClean="0">
+                <a:latin typeface="Arial" panose="020B0604020202020204" pitchFamily="34" charset="0"/>
+                <a:cs typeface="Arial" panose="020B0604020202020204" pitchFamily="34" charset="0"/>
+              </a:rPr>
+              <a:t>phases: </a:t>
+            </a:r>
+            <a:r>
+              <a:rPr lang="en-US" sz="2400" i="1" dirty="0">
+                <a:latin typeface="Arial" panose="020B0604020202020204" pitchFamily="34" charset="0"/>
+                <a:cs typeface="Arial" panose="020B0604020202020204" pitchFamily="34" charset="0"/>
+              </a:rPr>
+              <a:t>Pre-processing, Feature Extraction, </a:t>
+            </a:r>
+            <a:r>
+              <a:rPr lang="en-US" sz="2400" dirty="0">
+                <a:latin typeface="Arial" panose="020B0604020202020204" pitchFamily="34" charset="0"/>
+                <a:cs typeface="Arial" panose="020B0604020202020204" pitchFamily="34" charset="0"/>
+              </a:rPr>
+              <a:t>and</a:t>
+            </a:r>
+            <a:r>
+              <a:rPr lang="en-US" sz="2400" i="1" dirty="0">
+                <a:latin typeface="Arial" panose="020B0604020202020204" pitchFamily="34" charset="0"/>
+                <a:cs typeface="Arial" panose="020B0604020202020204" pitchFamily="34" charset="0"/>
+              </a:rPr>
+              <a:t> Classification</a:t>
+            </a:r>
+            <a:r>
+              <a:rPr lang="en-US" sz="2400" dirty="0">
+                <a:latin typeface="Arial" panose="020B0604020202020204" pitchFamily="34" charset="0"/>
+                <a:cs typeface="Arial" panose="020B0604020202020204" pitchFamily="34" charset="0"/>
+              </a:rPr>
+              <a:t>.  </a:t>
+            </a:r>
+            <a:r>
+              <a:rPr lang="en-US" sz="2400" b="1" dirty="0">
+                <a:latin typeface="Arial" panose="020B0604020202020204" pitchFamily="34" charset="0"/>
+                <a:cs typeface="Arial" panose="020B0604020202020204" pitchFamily="34" charset="0"/>
+              </a:rPr>
+              <a:t>Pre-processing</a:t>
+            </a:r>
+            <a:r>
+              <a:rPr lang="en-US" sz="2400" dirty="0">
+                <a:latin typeface="Arial" panose="020B0604020202020204" pitchFamily="34" charset="0"/>
+                <a:cs typeface="Arial" panose="020B0604020202020204" pitchFamily="34" charset="0"/>
+              </a:rPr>
+              <a:t> is modifying the input images to be able to extract meaningful data from them.  </a:t>
+            </a:r>
+            <a:r>
+              <a:rPr lang="en-US" sz="2400" b="1" dirty="0">
+                <a:latin typeface="Arial" panose="020B0604020202020204" pitchFamily="34" charset="0"/>
+                <a:cs typeface="Arial" panose="020B0604020202020204" pitchFamily="34" charset="0"/>
+              </a:rPr>
+              <a:t>Feature Extraction </a:t>
+            </a:r>
+            <a:r>
+              <a:rPr lang="en-US" sz="2400" dirty="0">
+                <a:latin typeface="Arial" panose="020B0604020202020204" pitchFamily="34" charset="0"/>
+                <a:cs typeface="Arial" panose="020B0604020202020204" pitchFamily="34" charset="0"/>
+              </a:rPr>
+              <a:t>takes the preprocessed images and retrieves the pertinent data that identifies water vs. </a:t>
+            </a:r>
+            <a:r>
+              <a:rPr lang="en-US" sz="2400" dirty="0" smtClean="0">
+                <a:latin typeface="Arial" panose="020B0604020202020204" pitchFamily="34" charset="0"/>
+                <a:cs typeface="Arial" panose="020B0604020202020204" pitchFamily="34" charset="0"/>
+              </a:rPr>
+              <a:t>non-water.  </a:t>
+            </a:r>
+            <a:r>
+              <a:rPr lang="en-US" sz="2400" b="1" dirty="0" smtClean="0">
+                <a:latin typeface="Arial" panose="020B0604020202020204" pitchFamily="34" charset="0"/>
+                <a:cs typeface="Arial" panose="020B0604020202020204" pitchFamily="34" charset="0"/>
+              </a:rPr>
+              <a:t>Classification</a:t>
+            </a:r>
+            <a:r>
+              <a:rPr lang="en-US" sz="2400" dirty="0" smtClean="0">
+                <a:latin typeface="Arial" panose="020B0604020202020204" pitchFamily="34" charset="0"/>
+                <a:cs typeface="Arial" panose="020B0604020202020204" pitchFamily="34" charset="0"/>
+              </a:rPr>
+              <a:t> </a:t>
             </a:r>
             <a:r>
               <a:rPr lang="en-US" sz="2400" dirty="0">
@@ -4212,96 +4443,6 @@
       <p:pic>
         <p:nvPicPr>
           <p:cNvPr id="28" name="Picture 27"/>
-          <p:cNvPicPr>
-            <a:picLocks noChangeAspect="1"/>
-          </p:cNvPicPr>
-          <p:nvPr/>
-        </p:nvPicPr>
-        <p:blipFill>
-          <a:blip r:embed="rId3" cstate="print">
-            <a:extLst>
-              <a:ext uri="{28A0092B-C50C-407E-A947-70E740481C1C}">
-                <a14:useLocalDpi xmlns:a14="http://schemas.microsoft.com/office/drawing/2010/main" val="0"/>
-              </a:ext>
-            </a:extLst>
-          </a:blip>
-          <a:stretch>
-            <a:fillRect/>
-          </a:stretch>
-        </p:blipFill>
-        <p:spPr>
-          <a:xfrm>
-            <a:off x="1418501" y="13162328"/>
-            <a:ext cx="3524250" cy="2643187"/>
-          </a:xfrm>
-          <a:prstGeom prst="rect">
-            <a:avLst/>
-          </a:prstGeom>
-        </p:spPr>
-      </p:pic>
-      <p:pic>
-        <p:nvPicPr>
-          <p:cNvPr id="30" name="Picture 29"/>
-          <p:cNvPicPr>
-            <a:picLocks noChangeAspect="1"/>
-          </p:cNvPicPr>
-          <p:nvPr/>
-        </p:nvPicPr>
-        <p:blipFill>
-          <a:blip r:embed="rId4" cstate="print">
-            <a:extLst>
-              <a:ext uri="{28A0092B-C50C-407E-A947-70E740481C1C}">
-                <a14:useLocalDpi xmlns:a14="http://schemas.microsoft.com/office/drawing/2010/main" val="0"/>
-              </a:ext>
-            </a:extLst>
-          </a:blip>
-          <a:stretch>
-            <a:fillRect/>
-          </a:stretch>
-        </p:blipFill>
-        <p:spPr>
-          <a:xfrm>
-            <a:off x="1114153" y="13515141"/>
-            <a:ext cx="3524250" cy="2643187"/>
-          </a:xfrm>
-          <a:prstGeom prst="rect">
-            <a:avLst/>
-          </a:prstGeom>
-        </p:spPr>
-      </p:pic>
-      <p:sp>
-        <p:nvSpPr>
-          <p:cNvPr id="36" name="TextBox 35"/>
-          <p:cNvSpPr txBox="1"/>
-          <p:nvPr/>
-        </p:nvSpPr>
-        <p:spPr>
-          <a:xfrm>
-            <a:off x="825277" y="12462702"/>
-            <a:ext cx="4117474" cy="523220"/>
-          </a:xfrm>
-          <a:prstGeom prst="rect">
-            <a:avLst/>
-          </a:prstGeom>
-          <a:noFill/>
-        </p:spPr>
-        <p:txBody>
-          <a:bodyPr wrap="none" rtlCol="0">
-            <a:spAutoFit/>
-          </a:bodyPr>
-          <a:lstStyle/>
-          <a:p>
-            <a:r>
-              <a:rPr lang="en-US" sz="2800" dirty="0" smtClean="0"/>
-              <a:t>1. Low Pass Temporal Filter</a:t>
-            </a:r>
-            <a:endParaRPr lang="en-US" sz="2800" dirty="0"/>
-          </a:p>
-        </p:txBody>
-      </p:sp>
-      <p:pic>
-        <p:nvPicPr>
-          <p:cNvPr id="37" name="Picture 36"/>
           <p:cNvPicPr>
             <a:picLocks noChangeAspect="1"/>
           </p:cNvPicPr>
@@ -4321,8 +4462,8 @@
         </p:blipFill>
         <p:spPr>
           <a:xfrm>
-            <a:off x="6305005" y="13515140"/>
-            <a:ext cx="3524249" cy="2643187"/>
+            <a:off x="1418501" y="13162328"/>
+            <a:ext cx="3524250" cy="2643187"/>
           </a:xfrm>
           <a:prstGeom prst="rect">
             <a:avLst/>
@@ -4331,7 +4472,7 @@
       </p:pic>
       <p:pic>
         <p:nvPicPr>
-          <p:cNvPr id="38" name="Picture 37"/>
+          <p:cNvPr id="30" name="Picture 29"/>
           <p:cNvPicPr>
             <a:picLocks noChangeAspect="1"/>
           </p:cNvPicPr>
@@ -4351,6 +4492,96 @@
         </p:blipFill>
         <p:spPr>
           <a:xfrm>
+            <a:off x="1114153" y="13515141"/>
+            <a:ext cx="3524250" cy="2643187"/>
+          </a:xfrm>
+          <a:prstGeom prst="rect">
+            <a:avLst/>
+          </a:prstGeom>
+        </p:spPr>
+      </p:pic>
+      <p:sp>
+        <p:nvSpPr>
+          <p:cNvPr id="36" name="TextBox 35"/>
+          <p:cNvSpPr txBox="1"/>
+          <p:nvPr/>
+        </p:nvSpPr>
+        <p:spPr>
+          <a:xfrm>
+            <a:off x="825277" y="12462702"/>
+            <a:ext cx="4117474" cy="523220"/>
+          </a:xfrm>
+          <a:prstGeom prst="rect">
+            <a:avLst/>
+          </a:prstGeom>
+          <a:noFill/>
+        </p:spPr>
+        <p:txBody>
+          <a:bodyPr wrap="none" rtlCol="0">
+            <a:spAutoFit/>
+          </a:bodyPr>
+          <a:lstStyle/>
+          <a:p>
+            <a:r>
+              <a:rPr lang="en-US" sz="2800" dirty="0" smtClean="0"/>
+              <a:t>1. Low Pass Temporal Filter</a:t>
+            </a:r>
+            <a:endParaRPr lang="en-US" sz="2800" dirty="0"/>
+          </a:p>
+        </p:txBody>
+      </p:sp>
+      <p:pic>
+        <p:nvPicPr>
+          <p:cNvPr id="37" name="Picture 36"/>
+          <p:cNvPicPr>
+            <a:picLocks noChangeAspect="1"/>
+          </p:cNvPicPr>
+          <p:nvPr/>
+        </p:nvPicPr>
+        <p:blipFill>
+          <a:blip r:embed="rId7" cstate="print">
+            <a:extLst>
+              <a:ext uri="{28A0092B-C50C-407E-A947-70E740481C1C}">
+                <a14:useLocalDpi xmlns:a14="http://schemas.microsoft.com/office/drawing/2010/main" val="0"/>
+              </a:ext>
+            </a:extLst>
+          </a:blip>
+          <a:stretch>
+            <a:fillRect/>
+          </a:stretch>
+        </p:blipFill>
+        <p:spPr>
+          <a:xfrm>
+            <a:off x="6305005" y="13515140"/>
+            <a:ext cx="3524249" cy="2643187"/>
+          </a:xfrm>
+          <a:prstGeom prst="rect">
+            <a:avLst/>
+          </a:prstGeom>
+        </p:spPr>
+      </p:pic>
+      <p:pic>
+        <p:nvPicPr>
+          <p:cNvPr id="38" name="Picture 37"/>
+          <p:cNvPicPr>
+            <a:picLocks noChangeAspect="1"/>
+          </p:cNvPicPr>
+          <p:nvPr/>
+        </p:nvPicPr>
+        <p:blipFill>
+          <a:blip r:embed="rId8" cstate="print">
+            <a:extLst>
+              <a:ext uri="{28A0092B-C50C-407E-A947-70E740481C1C}">
+                <a14:useLocalDpi xmlns:a14="http://schemas.microsoft.com/office/drawing/2010/main" val="0"/>
+              </a:ext>
+            </a:extLst>
+          </a:blip>
+          <a:stretch>
+            <a:fillRect/>
+          </a:stretch>
+        </p:blipFill>
+        <p:spPr>
+          <a:xfrm>
             <a:off x="809805" y="13867954"/>
             <a:ext cx="3524249" cy="2643187"/>
           </a:xfrm>
@@ -4438,7 +4669,7 @@
           <p:nvPr/>
         </p:nvPicPr>
         <p:blipFill>
-          <a:blip r:embed="rId7"/>
+          <a:blip r:embed="rId9"/>
           <a:stretch>
             <a:fillRect/>
           </a:stretch>
@@ -4502,7 +4733,7 @@
           <p:nvPr/>
         </p:nvPicPr>
         <p:blipFill>
-          <a:blip r:embed="rId8"/>
+          <a:blip r:embed="rId10"/>
           <a:stretch>
             <a:fillRect/>
           </a:stretch>
@@ -4526,7 +4757,7 @@
           <p:nvPr/>
         </p:nvPicPr>
         <p:blipFill>
-          <a:blip r:embed="rId9"/>
+          <a:blip r:embed="rId11"/>
           <a:stretch>
             <a:fillRect/>
           </a:stretch>
@@ -4544,60 +4775,6 @@
       <p:pic>
         <p:nvPicPr>
           <p:cNvPr id="46" name="Picture 45"/>
-          <p:cNvPicPr>
-            <a:picLocks noChangeAspect="1"/>
-          </p:cNvPicPr>
-          <p:nvPr/>
-        </p:nvPicPr>
-        <p:blipFill>
-          <a:blip r:embed="rId10"/>
-          <a:stretch>
-            <a:fillRect/>
-          </a:stretch>
-        </p:blipFill>
-        <p:spPr>
-          <a:xfrm>
-            <a:off x="22688726" y="13125143"/>
-            <a:ext cx="1596421" cy="1686231"/>
-          </a:xfrm>
-          <a:prstGeom prst="rect">
-            <a:avLst/>
-          </a:prstGeom>
-        </p:spPr>
-      </p:pic>
-      <p:pic>
-        <p:nvPicPr>
-          <p:cNvPr id="48" name="Picture 47"/>
-          <p:cNvPicPr>
-            <a:picLocks noChangeAspect="1"/>
-          </p:cNvPicPr>
-          <p:nvPr/>
-        </p:nvPicPr>
-        <p:blipFill>
-          <a:blip r:embed="rId11" cstate="print">
-            <a:extLst>
-              <a:ext uri="{28A0092B-C50C-407E-A947-70E740481C1C}">
-                <a14:useLocalDpi xmlns:a14="http://schemas.microsoft.com/office/drawing/2010/main" val="0"/>
-              </a:ext>
-            </a:extLst>
-          </a:blip>
-          <a:stretch>
-            <a:fillRect/>
-          </a:stretch>
-        </p:blipFill>
-        <p:spPr>
-          <a:xfrm>
-            <a:off x="26230205" y="13265704"/>
-            <a:ext cx="3524249" cy="2643187"/>
-          </a:xfrm>
-          <a:prstGeom prst="rect">
-            <a:avLst/>
-          </a:prstGeom>
-        </p:spPr>
-      </p:pic>
-      <p:pic>
-        <p:nvPicPr>
-          <p:cNvPr id="49" name="Picture 48"/>
           <p:cNvPicPr>
             <a:picLocks noChangeAspect="1"/>
           </p:cNvPicPr>
@@ -4611,8 +4788,8 @@
         </p:blipFill>
         <p:spPr>
           <a:xfrm>
-            <a:off x="15592379" y="4001732"/>
-            <a:ext cx="11077951" cy="4480000"/>
+            <a:off x="22688726" y="13125143"/>
+            <a:ext cx="1596421" cy="1686231"/>
           </a:xfrm>
           <a:prstGeom prst="rect">
             <a:avLst/>
@@ -4621,22 +4798,28 @@
       </p:pic>
       <p:pic>
         <p:nvPicPr>
-          <p:cNvPr id="50" name="Picture 49"/>
+          <p:cNvPr id="48" name="Picture 47"/>
           <p:cNvPicPr>
             <a:picLocks noChangeAspect="1"/>
           </p:cNvPicPr>
           <p:nvPr/>
         </p:nvPicPr>
         <p:blipFill>
-          <a:blip r:embed="rId13"/>
+          <a:blip r:embed="rId13" cstate="print">
+            <a:extLst>
+              <a:ext uri="{28A0092B-C50C-407E-A947-70E740481C1C}">
+                <a14:useLocalDpi xmlns:a14="http://schemas.microsoft.com/office/drawing/2010/main" val="0"/>
+              </a:ext>
+            </a:extLst>
+          </a:blip>
           <a:stretch>
             <a:fillRect/>
           </a:stretch>
         </p:blipFill>
         <p:spPr>
           <a:xfrm>
-            <a:off x="26871754" y="5147482"/>
-            <a:ext cx="5651100" cy="2150400"/>
+            <a:off x="26230205" y="13265704"/>
+            <a:ext cx="3524249" cy="2643187"/>
           </a:xfrm>
           <a:prstGeom prst="rect">
             <a:avLst/>
@@ -4737,6 +4920,114 @@
           </a:p>
         </p:txBody>
       </p:sp>
+      <p:pic>
+        <p:nvPicPr>
+          <p:cNvPr id="3" name="Picture 2"/>
+          <p:cNvPicPr>
+            <a:picLocks noChangeAspect="1"/>
+          </p:cNvPicPr>
+          <p:nvPr/>
+        </p:nvPicPr>
+        <p:blipFill>
+          <a:blip r:embed="rId14">
+            <a:extLst>
+              <a:ext uri="{28A0092B-C50C-407E-A947-70E740481C1C}">
+                <a14:useLocalDpi xmlns:a14="http://schemas.microsoft.com/office/drawing/2010/main" val="0"/>
+              </a:ext>
+            </a:extLst>
+          </a:blip>
+          <a:stretch>
+            <a:fillRect/>
+          </a:stretch>
+        </p:blipFill>
+        <p:spPr>
+          <a:xfrm>
+            <a:off x="457199" y="710506"/>
+            <a:ext cx="7301444" cy="1344649"/>
+          </a:xfrm>
+          <a:prstGeom prst="rect">
+            <a:avLst/>
+          </a:prstGeom>
+        </p:spPr>
+      </p:pic>
+      <p:pic>
+        <p:nvPicPr>
+          <p:cNvPr id="5" name="Picture 4"/>
+          <p:cNvPicPr>
+            <a:picLocks noChangeAspect="1"/>
+          </p:cNvPicPr>
+          <p:nvPr/>
+        </p:nvPicPr>
+        <p:blipFill>
+          <a:blip r:embed="rId15">
+            <a:extLst>
+              <a:ext uri="{28A0092B-C50C-407E-A947-70E740481C1C}">
+                <a14:useLocalDpi xmlns:a14="http://schemas.microsoft.com/office/drawing/2010/main" val="0"/>
+              </a:ext>
+            </a:extLst>
+          </a:blip>
+          <a:stretch>
+            <a:fillRect/>
+          </a:stretch>
+        </p:blipFill>
+        <p:spPr>
+          <a:xfrm>
+            <a:off x="25199534" y="791029"/>
+            <a:ext cx="7153489" cy="1427842"/>
+          </a:xfrm>
+          <a:prstGeom prst="rect">
+            <a:avLst/>
+          </a:prstGeom>
+        </p:spPr>
+      </p:pic>
+      <p:pic>
+        <p:nvPicPr>
+          <p:cNvPr id="11" name="Picture 10"/>
+          <p:cNvPicPr>
+            <a:picLocks noChangeAspect="1"/>
+          </p:cNvPicPr>
+          <p:nvPr/>
+        </p:nvPicPr>
+        <p:blipFill>
+          <a:blip r:embed="rId16"/>
+          <a:stretch>
+            <a:fillRect/>
+          </a:stretch>
+        </p:blipFill>
+        <p:spPr>
+          <a:xfrm>
+            <a:off x="15423242" y="3827992"/>
+            <a:ext cx="12219420" cy="4453817"/>
+          </a:xfrm>
+          <a:prstGeom prst="rect">
+            <a:avLst/>
+          </a:prstGeom>
+        </p:spPr>
+      </p:pic>
+      <p:pic>
+        <p:nvPicPr>
+          <p:cNvPr id="12" name="Picture 11"/>
+          <p:cNvPicPr>
+            <a:picLocks noChangeAspect="1"/>
+          </p:cNvPicPr>
+          <p:nvPr/>
+        </p:nvPicPr>
+        <p:blipFill>
+          <a:blip r:embed="rId17"/>
+          <a:stretch>
+            <a:fillRect/>
+          </a:stretch>
+        </p:blipFill>
+        <p:spPr>
+          <a:xfrm>
+            <a:off x="27992329" y="4961943"/>
+            <a:ext cx="4776525" cy="2150400"/>
+          </a:xfrm>
+          <a:prstGeom prst="rect">
+            <a:avLst/>
+          </a:prstGeom>
+        </p:spPr>
+      </p:pic>
     </p:spTree>
     <p:extLst>
       <p:ext uri="{BB962C8B-B14F-4D97-AF65-F5344CB8AC3E}">

</xml_diff>